<commit_message>
Added Roman Zavodskikh notes to class07
</commit_message>
<xml_diff>
--- a/talks/src/class07.pptx
+++ b/talks/src/class07.pptx
@@ -232,7 +232,7 @@
           <a:p>
             <a:fld id="{56C6788E-680A-49E5-BB93-D456A9D23A29}" type="datetimeFigureOut">
               <a:rPr lang="ru-RU" smtClean="0"/>
-              <a:t>18.11.2018</a:t>
+              <a:t>23.10.2019</a:t>
             </a:fld>
             <a:endParaRPr lang="ru-RU"/>
           </a:p>
@@ -401,7 +401,7 @@
           <a:p>
             <a:fld id="{C4DF4945-C160-4CD5-B124-49B9BE14C0AB}" type="datetimeFigureOut">
               <a:rPr lang="ru-RU" smtClean="0"/>
-              <a:t>18.11.2018</a:t>
+              <a:t>23.10.2019</a:t>
             </a:fld>
             <a:endParaRPr lang="ru-RU"/>
           </a:p>
@@ -3875,7 +3875,7 @@
           <a:p>
             <a:fld id="{12C63722-5D9F-4E99-9720-9B6A0C7BB1C9}" type="datetimeFigureOut">
               <a:rPr lang="ru-RU" smtClean="0"/>
-              <a:t>18.11.2018</a:t>
+              <a:t>23.10.2019</a:t>
             </a:fld>
             <a:endParaRPr lang="ru-RU"/>
           </a:p>
@@ -4045,7 +4045,7 @@
           <a:p>
             <a:fld id="{12C63722-5D9F-4E99-9720-9B6A0C7BB1C9}" type="datetimeFigureOut">
               <a:rPr lang="ru-RU" smtClean="0"/>
-              <a:t>18.11.2018</a:t>
+              <a:t>23.10.2019</a:t>
             </a:fld>
             <a:endParaRPr lang="ru-RU"/>
           </a:p>
@@ -4225,7 +4225,7 @@
           <a:p>
             <a:fld id="{12C63722-5D9F-4E99-9720-9B6A0C7BB1C9}" type="datetimeFigureOut">
               <a:rPr lang="ru-RU" smtClean="0"/>
-              <a:t>18.11.2018</a:t>
+              <a:t>23.10.2019</a:t>
             </a:fld>
             <a:endParaRPr lang="ru-RU"/>
           </a:p>
@@ -4417,7 +4417,7 @@
           <a:p>
             <a:fld id="{8C218C88-2408-4CFC-B25C-07450930B282}" type="datetimeFigureOut">
               <a:rPr lang="ru-RU" smtClean="0"/>
-              <a:t>18.11.2018</a:t>
+              <a:t>23.10.2019</a:t>
             </a:fld>
             <a:endParaRPr lang="ru-RU"/>
           </a:p>
@@ -4587,7 +4587,7 @@
           <a:p>
             <a:fld id="{8C218C88-2408-4CFC-B25C-07450930B282}" type="datetimeFigureOut">
               <a:rPr lang="ru-RU" smtClean="0"/>
-              <a:t>18.11.2018</a:t>
+              <a:t>23.10.2019</a:t>
             </a:fld>
             <a:endParaRPr lang="ru-RU"/>
           </a:p>
@@ -4833,7 +4833,7 @@
           <a:p>
             <a:fld id="{8C218C88-2408-4CFC-B25C-07450930B282}" type="datetimeFigureOut">
               <a:rPr lang="ru-RU" smtClean="0"/>
-              <a:t>18.11.2018</a:t>
+              <a:t>23.10.2019</a:t>
             </a:fld>
             <a:endParaRPr lang="ru-RU"/>
           </a:p>
@@ -5065,7 +5065,7 @@
           <a:p>
             <a:fld id="{8C218C88-2408-4CFC-B25C-07450930B282}" type="datetimeFigureOut">
               <a:rPr lang="ru-RU" smtClean="0"/>
-              <a:t>18.11.2018</a:t>
+              <a:t>23.10.2019</a:t>
             </a:fld>
             <a:endParaRPr lang="ru-RU"/>
           </a:p>
@@ -5432,7 +5432,7 @@
           <a:p>
             <a:fld id="{8C218C88-2408-4CFC-B25C-07450930B282}" type="datetimeFigureOut">
               <a:rPr lang="ru-RU" smtClean="0"/>
-              <a:t>18.11.2018</a:t>
+              <a:t>23.10.2019</a:t>
             </a:fld>
             <a:endParaRPr lang="ru-RU"/>
           </a:p>
@@ -5550,7 +5550,7 @@
           <a:p>
             <a:fld id="{8C218C88-2408-4CFC-B25C-07450930B282}" type="datetimeFigureOut">
               <a:rPr lang="ru-RU" smtClean="0"/>
-              <a:t>18.11.2018</a:t>
+              <a:t>23.10.2019</a:t>
             </a:fld>
             <a:endParaRPr lang="ru-RU"/>
           </a:p>
@@ -5645,7 +5645,7 @@
           <a:p>
             <a:fld id="{8C218C88-2408-4CFC-B25C-07450930B282}" type="datetimeFigureOut">
               <a:rPr lang="ru-RU" smtClean="0"/>
-              <a:t>18.11.2018</a:t>
+              <a:t>23.10.2019</a:t>
             </a:fld>
             <a:endParaRPr lang="ru-RU"/>
           </a:p>
@@ -5922,7 +5922,7 @@
           <a:p>
             <a:fld id="{8C218C88-2408-4CFC-B25C-07450930B282}" type="datetimeFigureOut">
               <a:rPr lang="ru-RU" smtClean="0"/>
-              <a:t>18.11.2018</a:t>
+              <a:t>23.10.2019</a:t>
             </a:fld>
             <a:endParaRPr lang="ru-RU"/>
           </a:p>
@@ -6092,7 +6092,7 @@
           <a:p>
             <a:fld id="{12C63722-5D9F-4E99-9720-9B6A0C7BB1C9}" type="datetimeFigureOut">
               <a:rPr lang="ru-RU" smtClean="0"/>
-              <a:t>18.11.2018</a:t>
+              <a:t>23.10.2019</a:t>
             </a:fld>
             <a:endParaRPr lang="ru-RU"/>
           </a:p>
@@ -6345,7 +6345,7 @@
           <a:p>
             <a:fld id="{8C218C88-2408-4CFC-B25C-07450930B282}" type="datetimeFigureOut">
               <a:rPr lang="ru-RU" smtClean="0"/>
-              <a:t>18.11.2018</a:t>
+              <a:t>23.10.2019</a:t>
             </a:fld>
             <a:endParaRPr lang="ru-RU"/>
           </a:p>
@@ -6515,7 +6515,7 @@
           <a:p>
             <a:fld id="{8C218C88-2408-4CFC-B25C-07450930B282}" type="datetimeFigureOut">
               <a:rPr lang="ru-RU" smtClean="0"/>
-              <a:t>18.11.2018</a:t>
+              <a:t>23.10.2019</a:t>
             </a:fld>
             <a:endParaRPr lang="ru-RU"/>
           </a:p>
@@ -6695,7 +6695,7 @@
           <a:p>
             <a:fld id="{8C218C88-2408-4CFC-B25C-07450930B282}" type="datetimeFigureOut">
               <a:rPr lang="ru-RU" smtClean="0"/>
-              <a:t>18.11.2018</a:t>
+              <a:t>23.10.2019</a:t>
             </a:fld>
             <a:endParaRPr lang="ru-RU"/>
           </a:p>
@@ -6941,7 +6941,7 @@
           <a:p>
             <a:fld id="{12C63722-5D9F-4E99-9720-9B6A0C7BB1C9}" type="datetimeFigureOut">
               <a:rPr lang="ru-RU" smtClean="0"/>
-              <a:t>18.11.2018</a:t>
+              <a:t>23.10.2019</a:t>
             </a:fld>
             <a:endParaRPr lang="ru-RU"/>
           </a:p>
@@ -7181,7 +7181,7 @@
           <a:p>
             <a:fld id="{12C63722-5D9F-4E99-9720-9B6A0C7BB1C9}" type="datetimeFigureOut">
               <a:rPr lang="ru-RU" smtClean="0"/>
-              <a:t>18.11.2018</a:t>
+              <a:t>23.10.2019</a:t>
             </a:fld>
             <a:endParaRPr lang="ru-RU"/>
           </a:p>
@@ -7548,7 +7548,7 @@
           <a:p>
             <a:fld id="{12C63722-5D9F-4E99-9720-9B6A0C7BB1C9}" type="datetimeFigureOut">
               <a:rPr lang="ru-RU" smtClean="0"/>
-              <a:t>18.11.2018</a:t>
+              <a:t>23.10.2019</a:t>
             </a:fld>
             <a:endParaRPr lang="ru-RU"/>
           </a:p>
@@ -7666,7 +7666,7 @@
           <a:p>
             <a:fld id="{12C63722-5D9F-4E99-9720-9B6A0C7BB1C9}" type="datetimeFigureOut">
               <a:rPr lang="ru-RU" smtClean="0"/>
-              <a:t>18.11.2018</a:t>
+              <a:t>23.10.2019</a:t>
             </a:fld>
             <a:endParaRPr lang="ru-RU"/>
           </a:p>
@@ -7761,7 +7761,7 @@
           <a:p>
             <a:fld id="{12C63722-5D9F-4E99-9720-9B6A0C7BB1C9}" type="datetimeFigureOut">
               <a:rPr lang="ru-RU" smtClean="0"/>
-              <a:t>18.11.2018</a:t>
+              <a:t>23.10.2019</a:t>
             </a:fld>
             <a:endParaRPr lang="ru-RU"/>
           </a:p>
@@ -8038,7 +8038,7 @@
           <a:p>
             <a:fld id="{12C63722-5D9F-4E99-9720-9B6A0C7BB1C9}" type="datetimeFigureOut">
               <a:rPr lang="ru-RU" smtClean="0"/>
-              <a:t>18.11.2018</a:t>
+              <a:t>23.10.2019</a:t>
             </a:fld>
             <a:endParaRPr lang="ru-RU"/>
           </a:p>
@@ -8291,7 +8291,7 @@
           <a:p>
             <a:fld id="{12C63722-5D9F-4E99-9720-9B6A0C7BB1C9}" type="datetimeFigureOut">
               <a:rPr lang="ru-RU" smtClean="0"/>
-              <a:t>18.11.2018</a:t>
+              <a:t>23.10.2019</a:t>
             </a:fld>
             <a:endParaRPr lang="ru-RU"/>
           </a:p>
@@ -8504,7 +8504,7 @@
           <a:p>
             <a:fld id="{12C63722-5D9F-4E99-9720-9B6A0C7BB1C9}" type="datetimeFigureOut">
               <a:rPr lang="ru-RU" smtClean="0"/>
-              <a:t>18.11.2018</a:t>
+              <a:t>23.10.2019</a:t>
             </a:fld>
             <a:endParaRPr lang="ru-RU"/>
           </a:p>
@@ -9044,7 +9044,7 @@
           <a:p>
             <a:fld id="{8C218C88-2408-4CFC-B25C-07450930B282}" type="datetimeFigureOut">
               <a:rPr lang="ru-RU" smtClean="0"/>
-              <a:t>18.11.2018</a:t>
+              <a:t>23.10.2019</a:t>
             </a:fld>
             <a:endParaRPr lang="ru-RU"/>
           </a:p>
@@ -10114,8 +10114,8 @@
           </a:graphicData>
         </a:graphic>
       </p:graphicFrame>
-      <mc:AlternateContent xmlns:mc="http://schemas.openxmlformats.org/markup-compatibility/2006">
-        <mc:Choice xmlns:a14="http://schemas.microsoft.com/office/drawing/2010/main" Requires="a14">
+      <mc:AlternateContent xmlns:mc="http://schemas.openxmlformats.org/markup-compatibility/2006" xmlns:a14="http://schemas.microsoft.com/office/drawing/2010/main">
+        <mc:Choice Requires="a14">
           <p:graphicFrame>
             <p:nvGraphicFramePr>
               <p:cNvPr id="3" name="Table 2"/>
@@ -10125,14 +10125,14 @@
               <p:nvPr>
                 <p:extLst>
                   <p:ext uri="{D42A27DB-BD31-4B8C-83A1-F6EECF244321}">
-                    <p14:modId xmlns:p14="http://schemas.microsoft.com/office/powerpoint/2010/main" val="1851305153"/>
+                    <p14:modId xmlns:p14="http://schemas.microsoft.com/office/powerpoint/2010/main" val="2628537779"/>
                   </p:ext>
                 </p:extLst>
               </p:nvPr>
             </p:nvGraphicFramePr>
             <p:xfrm>
               <a:off x="0" y="365760"/>
-              <a:ext cx="12192000" cy="4947539"/>
+              <a:ext cx="12192000" cy="5313299"/>
             </p:xfrm>
             <a:graphic>
               <a:graphicData uri="http://schemas.openxmlformats.org/drawingml/2006/table">
@@ -11155,12 +11155,56 @@
                       </a:ext>
                     </a:extLst>
                   </a:tr>
+                  <a:tr h="0">
+                    <a:tc>
+                      <a:txBody>
+                        <a:bodyPr/>
+                        <a:lstStyle/>
+                        <a:p>
+                          <a:pPr marL="0" marR="0" indent="0" algn="l" defTabSz="914400" rtl="0" eaLnBrk="1" fontAlgn="auto" latinLnBrk="0" hangingPunct="1">
+                            <a:lnSpc>
+                              <a:spcPct val="100000"/>
+                            </a:lnSpc>
+                            <a:spcBef>
+                              <a:spcPts val="0"/>
+                            </a:spcBef>
+                            <a:spcAft>
+                              <a:spcPts val="0"/>
+                            </a:spcAft>
+                            <a:buClrTx/>
+                            <a:buSzTx/>
+                            <a:buFontTx/>
+                            <a:buNone/>
+                            <a:tabLst/>
+                            <a:defRPr/>
+                          </a:pPr>
+                          <a:r>
+                            <a:rPr lang="en-US" baseline="0" dirty="0" smtClean="0">
+                              <a:hlinkClick r:id="rId3"/>
+                            </a:rPr>
+                            <a:t>http://www.sunshine2k.de/articles/coding/crc/understanding_crc.html</a:t>
+                          </a:r>
+                          <a:r>
+                            <a:rPr lang="en-US" baseline="0" dirty="0" smtClean="0"/>
+                            <a:t> </a:t>
+                          </a:r>
+                          <a:endParaRPr lang="ru-RU" baseline="0" dirty="0"/>
+                        </a:p>
+                      </a:txBody>
+                      <a:tcPr/>
+                    </a:tc>
+                    <a:extLst>
+                      <a:ext uri="{0D108BD9-81ED-4DB2-BD59-A6C34878D82A}">
+                        <a16:rowId xmlns:a16="http://schemas.microsoft.com/office/drawing/2014/main" val="799077774"/>
+                      </a:ext>
+                    </a:extLst>
+                  </a:tr>
                 </a:tbl>
               </a:graphicData>
             </a:graphic>
           </p:graphicFrame>
         </mc:Choice>
-        <mc:Fallback>
+        <mc:Fallback xmlns="">
           <p:graphicFrame>
             <p:nvGraphicFramePr>
               <p:cNvPr id="3" name="Table 2"/>
@@ -11170,14 +11214,14 @@
               <p:nvPr>
                 <p:extLst>
                   <p:ext uri="{D42A27DB-BD31-4B8C-83A1-F6EECF244321}">
-                    <p14:modId xmlns:p14="http://schemas.microsoft.com/office/powerpoint/2010/main" val="1851305153"/>
+                    <p14:modId xmlns:p14="http://schemas.microsoft.com/office/powerpoint/2010/main" val="2628537779"/>
                   </p:ext>
                 </p:extLst>
               </p:nvPr>
             </p:nvGraphicFramePr>
             <p:xfrm>
               <a:off x="0" y="365760"/>
-              <a:ext cx="12192000" cy="4947539"/>
+              <a:ext cx="12192000" cy="5313299"/>
             </p:xfrm>
             <a:graphic>
               <a:graphicData uri="http://schemas.openxmlformats.org/drawingml/2006/table">
@@ -11226,9 +11270,9 @@
                       </a:txBody>
                       <a:tcPr>
                         <a:blipFill>
-                          <a:blip r:embed="rId3"/>
+                          <a:blip r:embed="rId4"/>
                           <a:stretch>
-                            <a:fillRect t="-11268" b="-1972"/>
+                            <a:fillRect t="-11262" r="-100" b="-10312"/>
                           </a:stretch>
                         </a:blipFill>
                       </a:tcPr>
@@ -11236,6 +11280,50 @@
                     <a:extLst>
                       <a:ext uri="{0D108BD9-81ED-4DB2-BD59-A6C34878D82A}">
                         <a16:rowId xmlns:a16="http://schemas.microsoft.com/office/drawing/2014/main" val="10001"/>
+                      </a:ext>
+                    </a:extLst>
+                  </a:tr>
+                  <a:tr h="365760">
+                    <a:tc>
+                      <a:txBody>
+                        <a:bodyPr/>
+                        <a:lstStyle/>
+                        <a:p>
+                          <a:pPr marL="0" marR="0" indent="0" algn="l" defTabSz="914400" rtl="0" eaLnBrk="1" fontAlgn="auto" latinLnBrk="0" hangingPunct="1">
+                            <a:lnSpc>
+                              <a:spcPct val="100000"/>
+                            </a:lnSpc>
+                            <a:spcBef>
+                              <a:spcPts val="0"/>
+                            </a:spcBef>
+                            <a:spcAft>
+                              <a:spcPts val="0"/>
+                            </a:spcAft>
+                            <a:buClrTx/>
+                            <a:buSzTx/>
+                            <a:buFontTx/>
+                            <a:buNone/>
+                            <a:tabLst/>
+                            <a:defRPr/>
+                          </a:pPr>
+                          <a:r>
+                            <a:rPr lang="en-US" baseline="0" dirty="0" smtClean="0">
+                              <a:hlinkClick r:id="rId5"/>
+                            </a:rPr>
+                            <a:t>http://www.sunshine2k.de/articles/coding/crc/understanding_crc.html</a:t>
+                          </a:r>
+                          <a:r>
+                            <a:rPr lang="en-US" baseline="0" dirty="0" smtClean="0"/>
+                            <a:t> </a:t>
+                          </a:r>
+                          <a:endParaRPr lang="ru-RU" baseline="0" dirty="0"/>
+                        </a:p>
+                      </a:txBody>
+                      <a:tcPr/>
+                    </a:tc>
+                    <a:extLst>
+                      <a:ext uri="{0D108BD9-81ED-4DB2-BD59-A6C34878D82A}">
+                        <a16:rowId xmlns:a16="http://schemas.microsoft.com/office/drawing/2014/main" val="799077774"/>
                       </a:ext>
                     </a:extLst>
                   </a:tr>
@@ -14574,7 +14662,7 @@
           <p:nvPr>
             <p:extLst>
               <p:ext uri="{D42A27DB-BD31-4B8C-83A1-F6EECF244321}">
-                <p14:modId xmlns:p14="http://schemas.microsoft.com/office/powerpoint/2010/main" val="26704166"/>
+                <p14:modId xmlns:p14="http://schemas.microsoft.com/office/powerpoint/2010/main" val="1761479087"/>
               </p:ext>
             </p:extLst>
           </p:nvPr>
@@ -14606,9 +14694,10 @@
                     <a:p>
                       <a:pPr algn="ctr"/>
                       <a:r>
-                        <a:rPr lang="en-US" dirty="0"/>
-                        <a:t>hash0</a:t>
-                      </a:r>
+                        <a:rPr lang="en-US" dirty="0" smtClean="0"/>
+                        <a:t>hash1</a:t>
+                      </a:r>
+                      <a:endParaRPr lang="en-US" dirty="0"/>
                     </a:p>
                     <a:p>
                       <a:pPr algn="ctr"/>
@@ -14925,7 +15014,7 @@
           <p:nvPr>
             <p:extLst>
               <p:ext uri="{D42A27DB-BD31-4B8C-83A1-F6EECF244321}">
-                <p14:modId xmlns:p14="http://schemas.microsoft.com/office/powerpoint/2010/main" val="1165722980"/>
+                <p14:modId xmlns:p14="http://schemas.microsoft.com/office/powerpoint/2010/main" val="1605507117"/>
               </p:ext>
             </p:extLst>
           </p:nvPr>
@@ -14957,9 +15046,10 @@
                     <a:p>
                       <a:pPr algn="ctr"/>
                       <a:r>
-                        <a:rPr lang="en-US" dirty="0"/>
-                        <a:t>hash0-0</a:t>
-                      </a:r>
+                        <a:rPr lang="en-US" dirty="0" smtClean="0"/>
+                        <a:t>hash1-0</a:t>
+                      </a:r>
+                      <a:endParaRPr lang="en-US" dirty="0"/>
                     </a:p>
                     <a:p>
                       <a:pPr algn="ctr"/>
@@ -14973,7 +15063,15 @@
                       </a:r>
                       <a:r>
                         <a:rPr lang="en-US" dirty="0"/>
-                        <a:t> 0-0)</a:t>
+                        <a:t> </a:t>
+                      </a:r>
+                      <a:r>
+                        <a:rPr lang="en-US" dirty="0" smtClean="0"/>
+                        <a:t>1-0</a:t>
+                      </a:r>
+                      <a:r>
+                        <a:rPr lang="en-US" dirty="0"/>
+                        <a:t>)</a:t>
                       </a:r>
                     </a:p>
                   </a:txBody>
@@ -14998,7 +15096,7 @@
           <p:nvPr>
             <p:extLst>
               <p:ext uri="{D42A27DB-BD31-4B8C-83A1-F6EECF244321}">
-                <p14:modId xmlns:p14="http://schemas.microsoft.com/office/powerpoint/2010/main" val="812813279"/>
+                <p14:modId xmlns:p14="http://schemas.microsoft.com/office/powerpoint/2010/main" val="3324205976"/>
               </p:ext>
             </p:extLst>
           </p:nvPr>
@@ -15030,9 +15128,10 @@
                     <a:p>
                       <a:pPr algn="ctr"/>
                       <a:r>
-                        <a:rPr lang="en-US" dirty="0"/>
-                        <a:t>hash0-1</a:t>
-                      </a:r>
+                        <a:rPr lang="en-US" dirty="0" smtClean="0"/>
+                        <a:t>hash1-1</a:t>
+                      </a:r>
+                      <a:endParaRPr lang="en-US" dirty="0"/>
                     </a:p>
                     <a:p>
                       <a:pPr algn="ctr"/>
@@ -15046,7 +15145,15 @@
                       </a:r>
                       <a:r>
                         <a:rPr lang="en-US" dirty="0"/>
-                        <a:t> 0-1)</a:t>
+                        <a:t> </a:t>
+                      </a:r>
+                      <a:r>
+                        <a:rPr lang="en-US" dirty="0" smtClean="0"/>
+                        <a:t>1-1</a:t>
+                      </a:r>
+                      <a:r>
+                        <a:rPr lang="en-US" dirty="0"/>
+                        <a:t>)</a:t>
                       </a:r>
                     </a:p>
                   </a:txBody>
@@ -15132,6 +15239,392 @@
           </a:fontRef>
         </p:style>
       </p:cxnSp>
+      <p:graphicFrame>
+        <p:nvGraphicFramePr>
+          <p:cNvPr id="18" name="Table 17"/>
+          <p:cNvGraphicFramePr>
+            <a:graphicFrameLocks noGrp="1"/>
+          </p:cNvGraphicFramePr>
+          <p:nvPr>
+            <p:extLst>
+              <p:ext uri="{D42A27DB-BD31-4B8C-83A1-F6EECF244321}">
+                <p14:modId xmlns:p14="http://schemas.microsoft.com/office/powerpoint/2010/main" val="2700644764"/>
+              </p:ext>
+            </p:extLst>
+          </p:nvPr>
+        </p:nvGraphicFramePr>
+        <p:xfrm>
+          <a:off x="951733" y="4601650"/>
+          <a:ext cx="2194805" cy="370840"/>
+        </p:xfrm>
+        <a:graphic>
+          <a:graphicData uri="http://schemas.openxmlformats.org/drawingml/2006/table">
+            <a:tbl>
+              <a:tblPr firstRow="1" bandRow="1">
+                <a:tableStyleId>{BC89EF96-8CEA-46FF-86C4-4CE0E7609802}</a:tableStyleId>
+              </a:tblPr>
+              <a:tblGrid>
+                <a:gridCol w="2194805">
+                  <a:extLst>
+                    <a:ext uri="{9D8B030D-6E8A-4147-A177-3AD203B41FA5}">
+                      <a16:colId xmlns:a16="http://schemas.microsoft.com/office/drawing/2014/main" val="20000"/>
+                    </a:ext>
+                  </a:extLst>
+                </a:gridCol>
+              </a:tblGrid>
+              <a:tr h="370840">
+                <a:tc>
+                  <a:txBody>
+                    <a:bodyPr/>
+                    <a:lstStyle/>
+                    <a:p>
+                      <a:pPr algn="ctr"/>
+                      <a:r>
+                        <a:rPr lang="en-US" dirty="0" smtClean="0"/>
+                        <a:t>User</a:t>
+                      </a:r>
+                      <a:r>
+                        <a:rPr lang="en-US" baseline="0" dirty="0" smtClean="0"/>
+                        <a:t> data 0-0</a:t>
+                      </a:r>
+                      <a:endParaRPr lang="en-US" dirty="0"/>
+                    </a:p>
+                  </a:txBody>
+                  <a:tcPr/>
+                </a:tc>
+                <a:extLst>
+                  <a:ext uri="{0D108BD9-81ED-4DB2-BD59-A6C34878D82A}">
+                    <a16:rowId xmlns:a16="http://schemas.microsoft.com/office/drawing/2014/main" val="10000"/>
+                  </a:ext>
+                </a:extLst>
+              </a:tr>
+            </a:tbl>
+          </a:graphicData>
+        </a:graphic>
+      </p:graphicFrame>
+      <p:graphicFrame>
+        <p:nvGraphicFramePr>
+          <p:cNvPr id="20" name="Table 19"/>
+          <p:cNvGraphicFramePr>
+            <a:graphicFrameLocks noGrp="1"/>
+          </p:cNvGraphicFramePr>
+          <p:nvPr>
+            <p:extLst>
+              <p:ext uri="{D42A27DB-BD31-4B8C-83A1-F6EECF244321}">
+                <p14:modId xmlns:p14="http://schemas.microsoft.com/office/powerpoint/2010/main" val="3140245268"/>
+              </p:ext>
+            </p:extLst>
+          </p:nvPr>
+        </p:nvGraphicFramePr>
+        <p:xfrm>
+          <a:off x="3600678" y="4601650"/>
+          <a:ext cx="2194805" cy="370840"/>
+        </p:xfrm>
+        <a:graphic>
+          <a:graphicData uri="http://schemas.openxmlformats.org/drawingml/2006/table">
+            <a:tbl>
+              <a:tblPr firstRow="1" bandRow="1">
+                <a:tableStyleId>{BC89EF96-8CEA-46FF-86C4-4CE0E7609802}</a:tableStyleId>
+              </a:tblPr>
+              <a:tblGrid>
+                <a:gridCol w="2194805">
+                  <a:extLst>
+                    <a:ext uri="{9D8B030D-6E8A-4147-A177-3AD203B41FA5}">
+                      <a16:colId xmlns:a16="http://schemas.microsoft.com/office/drawing/2014/main" val="20000"/>
+                    </a:ext>
+                  </a:extLst>
+                </a:gridCol>
+              </a:tblGrid>
+              <a:tr h="370840">
+                <a:tc>
+                  <a:txBody>
+                    <a:bodyPr/>
+                    <a:lstStyle/>
+                    <a:p>
+                      <a:pPr algn="ctr"/>
+                      <a:r>
+                        <a:rPr lang="en-US" dirty="0" smtClean="0"/>
+                        <a:t>User</a:t>
+                      </a:r>
+                      <a:r>
+                        <a:rPr lang="en-US" baseline="0" dirty="0" smtClean="0"/>
+                        <a:t> data 0-1</a:t>
+                      </a:r>
+                      <a:endParaRPr lang="en-US" dirty="0"/>
+                    </a:p>
+                  </a:txBody>
+                  <a:tcPr/>
+                </a:tc>
+                <a:extLst>
+                  <a:ext uri="{0D108BD9-81ED-4DB2-BD59-A6C34878D82A}">
+                    <a16:rowId xmlns:a16="http://schemas.microsoft.com/office/drawing/2014/main" val="10000"/>
+                  </a:ext>
+                </a:extLst>
+              </a:tr>
+            </a:tbl>
+          </a:graphicData>
+        </a:graphic>
+      </p:graphicFrame>
+      <p:graphicFrame>
+        <p:nvGraphicFramePr>
+          <p:cNvPr id="21" name="Table 20"/>
+          <p:cNvGraphicFramePr>
+            <a:graphicFrameLocks noGrp="1"/>
+          </p:cNvGraphicFramePr>
+          <p:nvPr>
+            <p:extLst>
+              <p:ext uri="{D42A27DB-BD31-4B8C-83A1-F6EECF244321}">
+                <p14:modId xmlns:p14="http://schemas.microsoft.com/office/powerpoint/2010/main" val="3369140575"/>
+              </p:ext>
+            </p:extLst>
+          </p:nvPr>
+        </p:nvGraphicFramePr>
+        <p:xfrm>
+          <a:off x="6064172" y="4574373"/>
+          <a:ext cx="2194805" cy="370840"/>
+        </p:xfrm>
+        <a:graphic>
+          <a:graphicData uri="http://schemas.openxmlformats.org/drawingml/2006/table">
+            <a:tbl>
+              <a:tblPr firstRow="1" bandRow="1">
+                <a:tableStyleId>{BC89EF96-8CEA-46FF-86C4-4CE0E7609802}</a:tableStyleId>
+              </a:tblPr>
+              <a:tblGrid>
+                <a:gridCol w="2194805">
+                  <a:extLst>
+                    <a:ext uri="{9D8B030D-6E8A-4147-A177-3AD203B41FA5}">
+                      <a16:colId xmlns:a16="http://schemas.microsoft.com/office/drawing/2014/main" val="20000"/>
+                    </a:ext>
+                  </a:extLst>
+                </a:gridCol>
+              </a:tblGrid>
+              <a:tr h="370840">
+                <a:tc>
+                  <a:txBody>
+                    <a:bodyPr/>
+                    <a:lstStyle/>
+                    <a:p>
+                      <a:pPr algn="ctr"/>
+                      <a:r>
+                        <a:rPr lang="en-US" dirty="0" smtClean="0"/>
+                        <a:t>User</a:t>
+                      </a:r>
+                      <a:r>
+                        <a:rPr lang="en-US" baseline="0" dirty="0" smtClean="0"/>
+                        <a:t> data 1-0</a:t>
+                      </a:r>
+                      <a:endParaRPr lang="en-US" dirty="0"/>
+                    </a:p>
+                  </a:txBody>
+                  <a:tcPr/>
+                </a:tc>
+                <a:extLst>
+                  <a:ext uri="{0D108BD9-81ED-4DB2-BD59-A6C34878D82A}">
+                    <a16:rowId xmlns:a16="http://schemas.microsoft.com/office/drawing/2014/main" val="10000"/>
+                  </a:ext>
+                </a:extLst>
+              </a:tr>
+            </a:tbl>
+          </a:graphicData>
+        </a:graphic>
+      </p:graphicFrame>
+      <p:graphicFrame>
+        <p:nvGraphicFramePr>
+          <p:cNvPr id="22" name="Table 21"/>
+          <p:cNvGraphicFramePr>
+            <a:graphicFrameLocks noGrp="1"/>
+          </p:cNvGraphicFramePr>
+          <p:nvPr>
+            <p:extLst>
+              <p:ext uri="{D42A27DB-BD31-4B8C-83A1-F6EECF244321}">
+                <p14:modId xmlns:p14="http://schemas.microsoft.com/office/powerpoint/2010/main" val="2595719528"/>
+              </p:ext>
+            </p:extLst>
+          </p:nvPr>
+        </p:nvGraphicFramePr>
+        <p:xfrm>
+          <a:off x="8713117" y="4574373"/>
+          <a:ext cx="2194805" cy="370840"/>
+        </p:xfrm>
+        <a:graphic>
+          <a:graphicData uri="http://schemas.openxmlformats.org/drawingml/2006/table">
+            <a:tbl>
+              <a:tblPr firstRow="1" bandRow="1">
+                <a:tableStyleId>{BC89EF96-8CEA-46FF-86C4-4CE0E7609802}</a:tableStyleId>
+              </a:tblPr>
+              <a:tblGrid>
+                <a:gridCol w="2194805">
+                  <a:extLst>
+                    <a:ext uri="{9D8B030D-6E8A-4147-A177-3AD203B41FA5}">
+                      <a16:colId xmlns:a16="http://schemas.microsoft.com/office/drawing/2014/main" val="20000"/>
+                    </a:ext>
+                  </a:extLst>
+                </a:gridCol>
+              </a:tblGrid>
+              <a:tr h="370840">
+                <a:tc>
+                  <a:txBody>
+                    <a:bodyPr/>
+                    <a:lstStyle/>
+                    <a:p>
+                      <a:pPr algn="ctr"/>
+                      <a:r>
+                        <a:rPr lang="en-US" dirty="0" smtClean="0"/>
+                        <a:t>User</a:t>
+                      </a:r>
+                      <a:r>
+                        <a:rPr lang="en-US" baseline="0" dirty="0" smtClean="0"/>
+                        <a:t> data 1-1</a:t>
+                      </a:r>
+                      <a:endParaRPr lang="en-US" dirty="0"/>
+                    </a:p>
+                  </a:txBody>
+                  <a:tcPr/>
+                </a:tc>
+                <a:extLst>
+                  <a:ext uri="{0D108BD9-81ED-4DB2-BD59-A6C34878D82A}">
+                    <a16:rowId xmlns:a16="http://schemas.microsoft.com/office/drawing/2014/main" val="10000"/>
+                  </a:ext>
+                </a:extLst>
+              </a:tr>
+            </a:tbl>
+          </a:graphicData>
+        </a:graphic>
+      </p:graphicFrame>
+      <p:cxnSp>
+        <p:nvCxnSpPr>
+          <p:cNvPr id="23" name="Straight Arrow Connector 22"/>
+          <p:cNvCxnSpPr>
+            <a:endCxn id="18" idx="0"/>
+          </p:cNvCxnSpPr>
+          <p:nvPr/>
+        </p:nvCxnSpPr>
+        <p:spPr>
+          <a:xfrm flipH="1">
+            <a:off x="2049135" y="4241247"/>
+            <a:ext cx="1" cy="360403"/>
+          </a:xfrm>
+          <a:prstGeom prst="straightConnector1">
+            <a:avLst/>
+          </a:prstGeom>
+          <a:ln w="25400">
+            <a:tailEnd type="triangle"/>
+          </a:ln>
+        </p:spPr>
+        <p:style>
+          <a:lnRef idx="1">
+            <a:schemeClr val="accent1"/>
+          </a:lnRef>
+          <a:fillRef idx="0">
+            <a:schemeClr val="accent1"/>
+          </a:fillRef>
+          <a:effectRef idx="0">
+            <a:schemeClr val="accent1"/>
+          </a:effectRef>
+          <a:fontRef idx="minor">
+            <a:schemeClr val="tx1"/>
+          </a:fontRef>
+        </p:style>
+      </p:cxnSp>
+      <p:cxnSp>
+        <p:nvCxnSpPr>
+          <p:cNvPr id="24" name="Straight Arrow Connector 23"/>
+          <p:cNvCxnSpPr/>
+          <p:nvPr/>
+        </p:nvCxnSpPr>
+        <p:spPr>
+          <a:xfrm flipH="1">
+            <a:off x="4698080" y="4238569"/>
+            <a:ext cx="1" cy="360403"/>
+          </a:xfrm>
+          <a:prstGeom prst="straightConnector1">
+            <a:avLst/>
+          </a:prstGeom>
+          <a:ln w="25400">
+            <a:tailEnd type="triangle"/>
+          </a:ln>
+        </p:spPr>
+        <p:style>
+          <a:lnRef idx="1">
+            <a:schemeClr val="accent1"/>
+          </a:lnRef>
+          <a:fillRef idx="0">
+            <a:schemeClr val="accent1"/>
+          </a:fillRef>
+          <a:effectRef idx="0">
+            <a:schemeClr val="accent1"/>
+          </a:effectRef>
+          <a:fontRef idx="minor">
+            <a:schemeClr val="tx1"/>
+          </a:fontRef>
+        </p:style>
+      </p:cxnSp>
+      <p:cxnSp>
+        <p:nvCxnSpPr>
+          <p:cNvPr id="26" name="Straight Arrow Connector 25"/>
+          <p:cNvCxnSpPr/>
+          <p:nvPr/>
+        </p:nvCxnSpPr>
+        <p:spPr>
+          <a:xfrm flipH="1">
+            <a:off x="7161573" y="4211292"/>
+            <a:ext cx="1" cy="360403"/>
+          </a:xfrm>
+          <a:prstGeom prst="straightConnector1">
+            <a:avLst/>
+          </a:prstGeom>
+          <a:ln w="25400">
+            <a:tailEnd type="triangle"/>
+          </a:ln>
+        </p:spPr>
+        <p:style>
+          <a:lnRef idx="1">
+            <a:schemeClr val="accent1"/>
+          </a:lnRef>
+          <a:fillRef idx="0">
+            <a:schemeClr val="accent1"/>
+          </a:fillRef>
+          <a:effectRef idx="0">
+            <a:schemeClr val="accent1"/>
+          </a:effectRef>
+          <a:fontRef idx="minor">
+            <a:schemeClr val="tx1"/>
+          </a:fontRef>
+        </p:style>
+      </p:cxnSp>
+      <p:cxnSp>
+        <p:nvCxnSpPr>
+          <p:cNvPr id="29" name="Straight Arrow Connector 28"/>
+          <p:cNvCxnSpPr/>
+          <p:nvPr/>
+        </p:nvCxnSpPr>
+        <p:spPr>
+          <a:xfrm flipH="1">
+            <a:off x="9810519" y="4239246"/>
+            <a:ext cx="1" cy="360403"/>
+          </a:xfrm>
+          <a:prstGeom prst="straightConnector1">
+            <a:avLst/>
+          </a:prstGeom>
+          <a:ln w="25400">
+            <a:tailEnd type="triangle"/>
+          </a:ln>
+        </p:spPr>
+        <p:style>
+          <a:lnRef idx="1">
+            <a:schemeClr val="accent1"/>
+          </a:lnRef>
+          <a:fillRef idx="0">
+            <a:schemeClr val="accent1"/>
+          </a:fillRef>
+          <a:effectRef idx="0">
+            <a:schemeClr val="accent1"/>
+          </a:effectRef>
+          <a:fontRef idx="minor">
+            <a:schemeClr val="tx1"/>
+          </a:fontRef>
+        </p:style>
+      </p:cxnSp>
     </p:spTree>
     <p:extLst>
       <p:ext uri="{BB962C8B-B14F-4D97-AF65-F5344CB8AC3E}">
@@ -15284,12 +15777,16 @@
             <a:graphicFrameLocks noGrp="1"/>
           </p:cNvGraphicFramePr>
           <p:nvPr>
-            <p:extLst/>
+            <p:extLst>
+              <p:ext uri="{D42A27DB-BD31-4B8C-83A1-F6EECF244321}">
+                <p14:modId xmlns:p14="http://schemas.microsoft.com/office/powerpoint/2010/main" val="2328227352"/>
+              </p:ext>
+            </p:extLst>
           </p:nvPr>
         </p:nvGraphicFramePr>
         <p:xfrm>
           <a:off x="0" y="365761"/>
-          <a:ext cx="12192000" cy="5486400"/>
+          <a:ext cx="12192000" cy="5760720"/>
         </p:xfrm>
         <a:graphic>
           <a:graphicData uri="http://schemas.openxmlformats.org/drawingml/2006/table">
@@ -15387,9 +15884,16 @@
                       <a:endParaRPr lang="en-US" dirty="0"/>
                     </a:p>
                     <a:p>
+                      <a:endParaRPr lang="en-US" dirty="0" smtClean="0"/>
+                    </a:p>
+                    <a:p>
+                      <a:r>
+                        <a:rPr lang="ru-RU" dirty="0" smtClean="0"/>
+                        <a:t>Применения</a:t>
+                      </a:r>
                       <a:r>
                         <a:rPr lang="ru-RU" dirty="0"/>
-                        <a:t>Применения:</a:t>
+                        <a:t>:</a:t>
                       </a:r>
                     </a:p>
                     <a:p>
@@ -15399,15 +15903,19 @@
                       </a:pPr>
                       <a:r>
                         <a:rPr lang="ru-RU" dirty="0"/>
-                        <a:t>проверка целостности структуры дерева каталогов и дерева </a:t>
-                      </a:r>
-                      <a:r>
-                        <a:rPr lang="ru-RU" dirty="0" err="1"/>
-                        <a:t>екстентов</a:t>
+                        <a:t>проверка целостности структуры дерева каталогов и </a:t>
+                      </a:r>
+                      <a:r>
+                        <a:rPr lang="ru-RU"/>
+                        <a:t>дерева </a:t>
+                      </a:r>
+                      <a:r>
+                        <a:rPr lang="ru-RU" smtClean="0"/>
+                        <a:t>экстентов </a:t>
                       </a:r>
                       <a:r>
                         <a:rPr lang="ru-RU" dirty="0"/>
-                        <a:t> (</a:t>
+                        <a:t>(</a:t>
                       </a:r>
                       <a:r>
                         <a:rPr lang="en-US" dirty="0"/>
@@ -15473,12 +15981,16 @@
       </p:graphicFrame>
       <p:graphicFrame>
         <p:nvGraphicFramePr>
-          <p:cNvPr id="3" name="Table 2"/>
+          <p:cNvPr id="18" name="Table 17"/>
           <p:cNvGraphicFramePr>
             <a:graphicFrameLocks noGrp="1"/>
           </p:cNvGraphicFramePr>
           <p:nvPr>
-            <p:extLst/>
+            <p:extLst>
+              <p:ext uri="{D42A27DB-BD31-4B8C-83A1-F6EECF244321}">
+                <p14:modId xmlns:p14="http://schemas.microsoft.com/office/powerpoint/2010/main" val="1886641931"/>
+              </p:ext>
+            </p:extLst>
           </p:nvPr>
         </p:nvGraphicFramePr>
         <p:xfrm>
@@ -15534,12 +16046,16 @@
       </p:graphicFrame>
       <p:graphicFrame>
         <p:nvGraphicFramePr>
-          <p:cNvPr id="7" name="Table 6"/>
+          <p:cNvPr id="20" name="Table 19"/>
           <p:cNvGraphicFramePr>
             <a:graphicFrameLocks noGrp="1"/>
           </p:cNvGraphicFramePr>
           <p:nvPr>
-            <p:extLst/>
+            <p:extLst>
+              <p:ext uri="{D42A27DB-BD31-4B8C-83A1-F6EECF244321}">
+                <p14:modId xmlns:p14="http://schemas.microsoft.com/office/powerpoint/2010/main" val="3327435995"/>
+              </p:ext>
+            </p:extLst>
           </p:nvPr>
         </p:nvGraphicFramePr>
         <p:xfrm>
@@ -15595,12 +16111,16 @@
       </p:graphicFrame>
       <p:graphicFrame>
         <p:nvGraphicFramePr>
-          <p:cNvPr id="9" name="Table 8"/>
+          <p:cNvPr id="21" name="Table 20"/>
           <p:cNvGraphicFramePr>
             <a:graphicFrameLocks noGrp="1"/>
           </p:cNvGraphicFramePr>
           <p:nvPr>
-            <p:extLst/>
+            <p:extLst>
+              <p:ext uri="{D42A27DB-BD31-4B8C-83A1-F6EECF244321}">
+                <p14:modId xmlns:p14="http://schemas.microsoft.com/office/powerpoint/2010/main" val="1673929141"/>
+              </p:ext>
+            </p:extLst>
           </p:nvPr>
         </p:nvGraphicFramePr>
         <p:xfrm>
@@ -15630,9 +16150,10 @@
                     <a:p>
                       <a:pPr algn="ctr"/>
                       <a:r>
-                        <a:rPr lang="en-US" dirty="0"/>
-                        <a:t>hash0</a:t>
-                      </a:r>
+                        <a:rPr lang="en-US" dirty="0" smtClean="0"/>
+                        <a:t>hash1</a:t>
+                      </a:r>
+                      <a:endParaRPr lang="en-US" dirty="0"/>
                     </a:p>
                     <a:p>
                       <a:pPr algn="ctr"/>
@@ -15656,12 +16177,16 @@
       </p:graphicFrame>
       <p:graphicFrame>
         <p:nvGraphicFramePr>
-          <p:cNvPr id="10" name="Table 9"/>
+          <p:cNvPr id="22" name="Table 21"/>
           <p:cNvGraphicFramePr>
             <a:graphicFrameLocks noGrp="1"/>
           </p:cNvGraphicFramePr>
           <p:nvPr>
-            <p:extLst/>
+            <p:extLst>
+              <p:ext uri="{D42A27DB-BD31-4B8C-83A1-F6EECF244321}">
+                <p14:modId xmlns:p14="http://schemas.microsoft.com/office/powerpoint/2010/main" val="2016088071"/>
+              </p:ext>
+            </p:extLst>
           </p:nvPr>
         </p:nvGraphicFramePr>
         <p:xfrm>
@@ -15725,12 +16250,16 @@
       </p:graphicFrame>
       <p:graphicFrame>
         <p:nvGraphicFramePr>
-          <p:cNvPr id="12" name="Table 11"/>
+          <p:cNvPr id="23" name="Table 22"/>
           <p:cNvGraphicFramePr>
             <a:graphicFrameLocks noGrp="1"/>
           </p:cNvGraphicFramePr>
           <p:nvPr>
-            <p:extLst/>
+            <p:extLst>
+              <p:ext uri="{D42A27DB-BD31-4B8C-83A1-F6EECF244321}">
+                <p14:modId xmlns:p14="http://schemas.microsoft.com/office/powerpoint/2010/main" val="1619599920"/>
+              </p:ext>
+            </p:extLst>
           </p:nvPr>
         </p:nvGraphicFramePr>
         <p:xfrm>
@@ -15794,9 +16323,9 @@
       </p:graphicFrame>
       <p:cxnSp>
         <p:nvCxnSpPr>
-          <p:cNvPr id="15" name="Straight Arrow Connector 14"/>
+          <p:cNvPr id="24" name="Straight Arrow Connector 23"/>
           <p:cNvCxnSpPr>
-            <a:endCxn id="7" idx="0"/>
+            <a:endCxn id="20" idx="0"/>
           </p:cNvCxnSpPr>
           <p:nvPr/>
         </p:nvCxnSpPr>
@@ -15829,9 +16358,9 @@
       </p:cxnSp>
       <p:cxnSp>
         <p:nvCxnSpPr>
-          <p:cNvPr id="17" name="Straight Arrow Connector 16"/>
+          <p:cNvPr id="26" name="Straight Arrow Connector 25"/>
           <p:cNvCxnSpPr>
-            <a:endCxn id="9" idx="0"/>
+            <a:endCxn id="21" idx="0"/>
           </p:cNvCxnSpPr>
           <p:nvPr/>
         </p:nvCxnSpPr>
@@ -15864,9 +16393,9 @@
       </p:cxnSp>
       <p:cxnSp>
         <p:nvCxnSpPr>
-          <p:cNvPr id="19" name="Straight Arrow Connector 18"/>
+          <p:cNvPr id="29" name="Straight Arrow Connector 28"/>
           <p:cNvCxnSpPr>
-            <a:endCxn id="10" idx="0"/>
+            <a:endCxn id="22" idx="0"/>
           </p:cNvCxnSpPr>
           <p:nvPr/>
         </p:nvCxnSpPr>
@@ -15899,9 +16428,9 @@
       </p:cxnSp>
       <p:cxnSp>
         <p:nvCxnSpPr>
-          <p:cNvPr id="25" name="Straight Arrow Connector 24"/>
+          <p:cNvPr id="31" name="Straight Arrow Connector 30"/>
           <p:cNvCxnSpPr>
-            <a:endCxn id="12" idx="0"/>
+            <a:endCxn id="23" idx="0"/>
           </p:cNvCxnSpPr>
           <p:nvPr/>
         </p:nvCxnSpPr>
@@ -15934,12 +16463,16 @@
       </p:cxnSp>
       <p:graphicFrame>
         <p:nvGraphicFramePr>
-          <p:cNvPr id="27" name="Table 26"/>
+          <p:cNvPr id="32" name="Table 31"/>
           <p:cNvGraphicFramePr>
             <a:graphicFrameLocks noGrp="1"/>
           </p:cNvGraphicFramePr>
           <p:nvPr>
-            <p:extLst/>
+            <p:extLst>
+              <p:ext uri="{D42A27DB-BD31-4B8C-83A1-F6EECF244321}">
+                <p14:modId xmlns:p14="http://schemas.microsoft.com/office/powerpoint/2010/main" val="4018571130"/>
+              </p:ext>
+            </p:extLst>
           </p:nvPr>
         </p:nvGraphicFramePr>
         <p:xfrm>
@@ -15969,9 +16502,10 @@
                     <a:p>
                       <a:pPr algn="ctr"/>
                       <a:r>
-                        <a:rPr lang="en-US" dirty="0"/>
-                        <a:t>hash0-0</a:t>
-                      </a:r>
+                        <a:rPr lang="en-US" dirty="0" smtClean="0"/>
+                        <a:t>hash1-0</a:t>
+                      </a:r>
+                      <a:endParaRPr lang="en-US" dirty="0"/>
                     </a:p>
                     <a:p>
                       <a:pPr algn="ctr"/>
@@ -15985,7 +16519,15 @@
                       </a:r>
                       <a:r>
                         <a:rPr lang="en-US" dirty="0"/>
-                        <a:t> 0-0)</a:t>
+                        <a:t> </a:t>
+                      </a:r>
+                      <a:r>
+                        <a:rPr lang="en-US" dirty="0" smtClean="0"/>
+                        <a:t>1-0</a:t>
+                      </a:r>
+                      <a:r>
+                        <a:rPr lang="en-US" dirty="0"/>
+                        <a:t>)</a:t>
                       </a:r>
                     </a:p>
                   </a:txBody>
@@ -16003,12 +16545,16 @@
       </p:graphicFrame>
       <p:graphicFrame>
         <p:nvGraphicFramePr>
-          <p:cNvPr id="28" name="Table 27"/>
+          <p:cNvPr id="33" name="Table 32"/>
           <p:cNvGraphicFramePr>
             <a:graphicFrameLocks noGrp="1"/>
           </p:cNvGraphicFramePr>
           <p:nvPr>
-            <p:extLst/>
+            <p:extLst>
+              <p:ext uri="{D42A27DB-BD31-4B8C-83A1-F6EECF244321}">
+                <p14:modId xmlns:p14="http://schemas.microsoft.com/office/powerpoint/2010/main" val="1610658206"/>
+              </p:ext>
+            </p:extLst>
           </p:nvPr>
         </p:nvGraphicFramePr>
         <p:xfrm>
@@ -16038,9 +16584,10 @@
                     <a:p>
                       <a:pPr algn="ctr"/>
                       <a:r>
-                        <a:rPr lang="en-US" dirty="0"/>
-                        <a:t>hash0-1</a:t>
-                      </a:r>
+                        <a:rPr lang="en-US" dirty="0" smtClean="0"/>
+                        <a:t>hash1-1</a:t>
+                      </a:r>
+                      <a:endParaRPr lang="en-US" dirty="0"/>
                     </a:p>
                     <a:p>
                       <a:pPr algn="ctr"/>
@@ -16054,7 +16601,15 @@
                       </a:r>
                       <a:r>
                         <a:rPr lang="en-US" dirty="0"/>
-                        <a:t> 0-1)</a:t>
+                        <a:t> </a:t>
+                      </a:r>
+                      <a:r>
+                        <a:rPr lang="en-US" dirty="0" smtClean="0"/>
+                        <a:t>1-1</a:t>
+                      </a:r>
+                      <a:r>
+                        <a:rPr lang="en-US" dirty="0"/>
+                        <a:t>)</a:t>
                       </a:r>
                     </a:p>
                   </a:txBody>
@@ -16072,9 +16627,9 @@
       </p:graphicFrame>
       <p:cxnSp>
         <p:nvCxnSpPr>
-          <p:cNvPr id="30" name="Straight Arrow Connector 29"/>
+          <p:cNvPr id="34" name="Straight Arrow Connector 33"/>
           <p:cNvCxnSpPr>
-            <a:endCxn id="27" idx="0"/>
+            <a:endCxn id="32" idx="0"/>
           </p:cNvCxnSpPr>
           <p:nvPr/>
         </p:nvCxnSpPr>
@@ -16107,9 +16662,9 @@
       </p:cxnSp>
       <p:cxnSp>
         <p:nvCxnSpPr>
-          <p:cNvPr id="38" name="Straight Arrow Connector 37"/>
+          <p:cNvPr id="35" name="Straight Arrow Connector 34"/>
           <p:cNvCxnSpPr>
-            <a:endCxn id="28" idx="0"/>
+            <a:endCxn id="33" idx="0"/>
           </p:cNvCxnSpPr>
           <p:nvPr/>
         </p:nvCxnSpPr>
@@ -16117,6 +16672,392 @@
           <a:xfrm flipH="1">
             <a:off x="9810520" y="3012164"/>
             <a:ext cx="4283" cy="589003"/>
+          </a:xfrm>
+          <a:prstGeom prst="straightConnector1">
+            <a:avLst/>
+          </a:prstGeom>
+          <a:ln w="25400">
+            <a:tailEnd type="triangle"/>
+          </a:ln>
+        </p:spPr>
+        <p:style>
+          <a:lnRef idx="1">
+            <a:schemeClr val="accent1"/>
+          </a:lnRef>
+          <a:fillRef idx="0">
+            <a:schemeClr val="accent1"/>
+          </a:fillRef>
+          <a:effectRef idx="0">
+            <a:schemeClr val="accent1"/>
+          </a:effectRef>
+          <a:fontRef idx="minor">
+            <a:schemeClr val="tx1"/>
+          </a:fontRef>
+        </p:style>
+      </p:cxnSp>
+      <p:graphicFrame>
+        <p:nvGraphicFramePr>
+          <p:cNvPr id="36" name="Table 35"/>
+          <p:cNvGraphicFramePr>
+            <a:graphicFrameLocks noGrp="1"/>
+          </p:cNvGraphicFramePr>
+          <p:nvPr>
+            <p:extLst>
+              <p:ext uri="{D42A27DB-BD31-4B8C-83A1-F6EECF244321}">
+                <p14:modId xmlns:p14="http://schemas.microsoft.com/office/powerpoint/2010/main" val="3832701430"/>
+              </p:ext>
+            </p:extLst>
+          </p:nvPr>
+        </p:nvGraphicFramePr>
+        <p:xfrm>
+          <a:off x="951733" y="4601650"/>
+          <a:ext cx="2194805" cy="370840"/>
+        </p:xfrm>
+        <a:graphic>
+          <a:graphicData uri="http://schemas.openxmlformats.org/drawingml/2006/table">
+            <a:tbl>
+              <a:tblPr firstRow="1" bandRow="1">
+                <a:tableStyleId>{BC89EF96-8CEA-46FF-86C4-4CE0E7609802}</a:tableStyleId>
+              </a:tblPr>
+              <a:tblGrid>
+                <a:gridCol w="2194805">
+                  <a:extLst>
+                    <a:ext uri="{9D8B030D-6E8A-4147-A177-3AD203B41FA5}">
+                      <a16:colId xmlns:a16="http://schemas.microsoft.com/office/drawing/2014/main" val="20000"/>
+                    </a:ext>
+                  </a:extLst>
+                </a:gridCol>
+              </a:tblGrid>
+              <a:tr h="370840">
+                <a:tc>
+                  <a:txBody>
+                    <a:bodyPr/>
+                    <a:lstStyle/>
+                    <a:p>
+                      <a:pPr algn="ctr"/>
+                      <a:r>
+                        <a:rPr lang="en-US" dirty="0" smtClean="0"/>
+                        <a:t>User</a:t>
+                      </a:r>
+                      <a:r>
+                        <a:rPr lang="en-US" baseline="0" dirty="0" smtClean="0"/>
+                        <a:t> data 0-0</a:t>
+                      </a:r>
+                      <a:endParaRPr lang="en-US" dirty="0"/>
+                    </a:p>
+                  </a:txBody>
+                  <a:tcPr/>
+                </a:tc>
+                <a:extLst>
+                  <a:ext uri="{0D108BD9-81ED-4DB2-BD59-A6C34878D82A}">
+                    <a16:rowId xmlns:a16="http://schemas.microsoft.com/office/drawing/2014/main" val="10000"/>
+                  </a:ext>
+                </a:extLst>
+              </a:tr>
+            </a:tbl>
+          </a:graphicData>
+        </a:graphic>
+      </p:graphicFrame>
+      <p:graphicFrame>
+        <p:nvGraphicFramePr>
+          <p:cNvPr id="37" name="Table 36"/>
+          <p:cNvGraphicFramePr>
+            <a:graphicFrameLocks noGrp="1"/>
+          </p:cNvGraphicFramePr>
+          <p:nvPr>
+            <p:extLst>
+              <p:ext uri="{D42A27DB-BD31-4B8C-83A1-F6EECF244321}">
+                <p14:modId xmlns:p14="http://schemas.microsoft.com/office/powerpoint/2010/main" val="3014440261"/>
+              </p:ext>
+            </p:extLst>
+          </p:nvPr>
+        </p:nvGraphicFramePr>
+        <p:xfrm>
+          <a:off x="3600678" y="4601650"/>
+          <a:ext cx="2194805" cy="370840"/>
+        </p:xfrm>
+        <a:graphic>
+          <a:graphicData uri="http://schemas.openxmlformats.org/drawingml/2006/table">
+            <a:tbl>
+              <a:tblPr firstRow="1" bandRow="1">
+                <a:tableStyleId>{BC89EF96-8CEA-46FF-86C4-4CE0E7609802}</a:tableStyleId>
+              </a:tblPr>
+              <a:tblGrid>
+                <a:gridCol w="2194805">
+                  <a:extLst>
+                    <a:ext uri="{9D8B030D-6E8A-4147-A177-3AD203B41FA5}">
+                      <a16:colId xmlns:a16="http://schemas.microsoft.com/office/drawing/2014/main" val="20000"/>
+                    </a:ext>
+                  </a:extLst>
+                </a:gridCol>
+              </a:tblGrid>
+              <a:tr h="370840">
+                <a:tc>
+                  <a:txBody>
+                    <a:bodyPr/>
+                    <a:lstStyle/>
+                    <a:p>
+                      <a:pPr algn="ctr"/>
+                      <a:r>
+                        <a:rPr lang="en-US" dirty="0" smtClean="0"/>
+                        <a:t>User</a:t>
+                      </a:r>
+                      <a:r>
+                        <a:rPr lang="en-US" baseline="0" dirty="0" smtClean="0"/>
+                        <a:t> data 0-1</a:t>
+                      </a:r>
+                      <a:endParaRPr lang="en-US" dirty="0"/>
+                    </a:p>
+                  </a:txBody>
+                  <a:tcPr/>
+                </a:tc>
+                <a:extLst>
+                  <a:ext uri="{0D108BD9-81ED-4DB2-BD59-A6C34878D82A}">
+                    <a16:rowId xmlns:a16="http://schemas.microsoft.com/office/drawing/2014/main" val="10000"/>
+                  </a:ext>
+                </a:extLst>
+              </a:tr>
+            </a:tbl>
+          </a:graphicData>
+        </a:graphic>
+      </p:graphicFrame>
+      <p:graphicFrame>
+        <p:nvGraphicFramePr>
+          <p:cNvPr id="39" name="Table 38"/>
+          <p:cNvGraphicFramePr>
+            <a:graphicFrameLocks noGrp="1"/>
+          </p:cNvGraphicFramePr>
+          <p:nvPr>
+            <p:extLst>
+              <p:ext uri="{D42A27DB-BD31-4B8C-83A1-F6EECF244321}">
+                <p14:modId xmlns:p14="http://schemas.microsoft.com/office/powerpoint/2010/main" val="51621720"/>
+              </p:ext>
+            </p:extLst>
+          </p:nvPr>
+        </p:nvGraphicFramePr>
+        <p:xfrm>
+          <a:off x="6064172" y="4574373"/>
+          <a:ext cx="2194805" cy="370840"/>
+        </p:xfrm>
+        <a:graphic>
+          <a:graphicData uri="http://schemas.openxmlformats.org/drawingml/2006/table">
+            <a:tbl>
+              <a:tblPr firstRow="1" bandRow="1">
+                <a:tableStyleId>{BC89EF96-8CEA-46FF-86C4-4CE0E7609802}</a:tableStyleId>
+              </a:tblPr>
+              <a:tblGrid>
+                <a:gridCol w="2194805">
+                  <a:extLst>
+                    <a:ext uri="{9D8B030D-6E8A-4147-A177-3AD203B41FA5}">
+                      <a16:colId xmlns:a16="http://schemas.microsoft.com/office/drawing/2014/main" val="20000"/>
+                    </a:ext>
+                  </a:extLst>
+                </a:gridCol>
+              </a:tblGrid>
+              <a:tr h="370840">
+                <a:tc>
+                  <a:txBody>
+                    <a:bodyPr/>
+                    <a:lstStyle/>
+                    <a:p>
+                      <a:pPr algn="ctr"/>
+                      <a:r>
+                        <a:rPr lang="en-US" dirty="0" smtClean="0"/>
+                        <a:t>User</a:t>
+                      </a:r>
+                      <a:r>
+                        <a:rPr lang="en-US" baseline="0" dirty="0" smtClean="0"/>
+                        <a:t> data 1-0</a:t>
+                      </a:r>
+                      <a:endParaRPr lang="en-US" dirty="0"/>
+                    </a:p>
+                  </a:txBody>
+                  <a:tcPr/>
+                </a:tc>
+                <a:extLst>
+                  <a:ext uri="{0D108BD9-81ED-4DB2-BD59-A6C34878D82A}">
+                    <a16:rowId xmlns:a16="http://schemas.microsoft.com/office/drawing/2014/main" val="10000"/>
+                  </a:ext>
+                </a:extLst>
+              </a:tr>
+            </a:tbl>
+          </a:graphicData>
+        </a:graphic>
+      </p:graphicFrame>
+      <p:graphicFrame>
+        <p:nvGraphicFramePr>
+          <p:cNvPr id="40" name="Table 39"/>
+          <p:cNvGraphicFramePr>
+            <a:graphicFrameLocks noGrp="1"/>
+          </p:cNvGraphicFramePr>
+          <p:nvPr>
+            <p:extLst>
+              <p:ext uri="{D42A27DB-BD31-4B8C-83A1-F6EECF244321}">
+                <p14:modId xmlns:p14="http://schemas.microsoft.com/office/powerpoint/2010/main" val="3885005569"/>
+              </p:ext>
+            </p:extLst>
+          </p:nvPr>
+        </p:nvGraphicFramePr>
+        <p:xfrm>
+          <a:off x="8713117" y="4574373"/>
+          <a:ext cx="2194805" cy="370840"/>
+        </p:xfrm>
+        <a:graphic>
+          <a:graphicData uri="http://schemas.openxmlformats.org/drawingml/2006/table">
+            <a:tbl>
+              <a:tblPr firstRow="1" bandRow="1">
+                <a:tableStyleId>{BC89EF96-8CEA-46FF-86C4-4CE0E7609802}</a:tableStyleId>
+              </a:tblPr>
+              <a:tblGrid>
+                <a:gridCol w="2194805">
+                  <a:extLst>
+                    <a:ext uri="{9D8B030D-6E8A-4147-A177-3AD203B41FA5}">
+                      <a16:colId xmlns:a16="http://schemas.microsoft.com/office/drawing/2014/main" val="20000"/>
+                    </a:ext>
+                  </a:extLst>
+                </a:gridCol>
+              </a:tblGrid>
+              <a:tr h="370840">
+                <a:tc>
+                  <a:txBody>
+                    <a:bodyPr/>
+                    <a:lstStyle/>
+                    <a:p>
+                      <a:pPr algn="ctr"/>
+                      <a:r>
+                        <a:rPr lang="en-US" dirty="0" smtClean="0"/>
+                        <a:t>User</a:t>
+                      </a:r>
+                      <a:r>
+                        <a:rPr lang="en-US" baseline="0" dirty="0" smtClean="0"/>
+                        <a:t> data 1-1</a:t>
+                      </a:r>
+                      <a:endParaRPr lang="en-US" dirty="0"/>
+                    </a:p>
+                  </a:txBody>
+                  <a:tcPr/>
+                </a:tc>
+                <a:extLst>
+                  <a:ext uri="{0D108BD9-81ED-4DB2-BD59-A6C34878D82A}">
+                    <a16:rowId xmlns:a16="http://schemas.microsoft.com/office/drawing/2014/main" val="10000"/>
+                  </a:ext>
+                </a:extLst>
+              </a:tr>
+            </a:tbl>
+          </a:graphicData>
+        </a:graphic>
+      </p:graphicFrame>
+      <p:cxnSp>
+        <p:nvCxnSpPr>
+          <p:cNvPr id="41" name="Straight Arrow Connector 40"/>
+          <p:cNvCxnSpPr>
+            <a:endCxn id="36" idx="0"/>
+          </p:cNvCxnSpPr>
+          <p:nvPr/>
+        </p:nvCxnSpPr>
+        <p:spPr>
+          <a:xfrm flipH="1">
+            <a:off x="2049135" y="4241247"/>
+            <a:ext cx="1" cy="360403"/>
+          </a:xfrm>
+          <a:prstGeom prst="straightConnector1">
+            <a:avLst/>
+          </a:prstGeom>
+          <a:ln w="25400">
+            <a:tailEnd type="triangle"/>
+          </a:ln>
+        </p:spPr>
+        <p:style>
+          <a:lnRef idx="1">
+            <a:schemeClr val="accent1"/>
+          </a:lnRef>
+          <a:fillRef idx="0">
+            <a:schemeClr val="accent1"/>
+          </a:fillRef>
+          <a:effectRef idx="0">
+            <a:schemeClr val="accent1"/>
+          </a:effectRef>
+          <a:fontRef idx="minor">
+            <a:schemeClr val="tx1"/>
+          </a:fontRef>
+        </p:style>
+      </p:cxnSp>
+      <p:cxnSp>
+        <p:nvCxnSpPr>
+          <p:cNvPr id="42" name="Straight Arrow Connector 41"/>
+          <p:cNvCxnSpPr/>
+          <p:nvPr/>
+        </p:nvCxnSpPr>
+        <p:spPr>
+          <a:xfrm flipH="1">
+            <a:off x="4698080" y="4238569"/>
+            <a:ext cx="1" cy="360403"/>
+          </a:xfrm>
+          <a:prstGeom prst="straightConnector1">
+            <a:avLst/>
+          </a:prstGeom>
+          <a:ln w="25400">
+            <a:tailEnd type="triangle"/>
+          </a:ln>
+        </p:spPr>
+        <p:style>
+          <a:lnRef idx="1">
+            <a:schemeClr val="accent1"/>
+          </a:lnRef>
+          <a:fillRef idx="0">
+            <a:schemeClr val="accent1"/>
+          </a:fillRef>
+          <a:effectRef idx="0">
+            <a:schemeClr val="accent1"/>
+          </a:effectRef>
+          <a:fontRef idx="minor">
+            <a:schemeClr val="tx1"/>
+          </a:fontRef>
+        </p:style>
+      </p:cxnSp>
+      <p:cxnSp>
+        <p:nvCxnSpPr>
+          <p:cNvPr id="43" name="Straight Arrow Connector 42"/>
+          <p:cNvCxnSpPr/>
+          <p:nvPr/>
+        </p:nvCxnSpPr>
+        <p:spPr>
+          <a:xfrm flipH="1">
+            <a:off x="7161573" y="4211292"/>
+            <a:ext cx="1" cy="360403"/>
+          </a:xfrm>
+          <a:prstGeom prst="straightConnector1">
+            <a:avLst/>
+          </a:prstGeom>
+          <a:ln w="25400">
+            <a:tailEnd type="triangle"/>
+          </a:ln>
+        </p:spPr>
+        <p:style>
+          <a:lnRef idx="1">
+            <a:schemeClr val="accent1"/>
+          </a:lnRef>
+          <a:fillRef idx="0">
+            <a:schemeClr val="accent1"/>
+          </a:fillRef>
+          <a:effectRef idx="0">
+            <a:schemeClr val="accent1"/>
+          </a:effectRef>
+          <a:fontRef idx="minor">
+            <a:schemeClr val="tx1"/>
+          </a:fontRef>
+        </p:style>
+      </p:cxnSp>
+      <p:cxnSp>
+        <p:nvCxnSpPr>
+          <p:cNvPr id="44" name="Straight Arrow Connector 43"/>
+          <p:cNvCxnSpPr/>
+          <p:nvPr/>
+        </p:nvCxnSpPr>
+        <p:spPr>
+          <a:xfrm flipH="1">
+            <a:off x="9810519" y="4239246"/>
+            <a:ext cx="1" cy="360403"/>
           </a:xfrm>
           <a:prstGeom prst="straightConnector1">
             <a:avLst/>
@@ -19268,6 +20209,10 @@
                         <a:rPr lang="en-US" baseline="0" dirty="0"/>
                         <a:t>RAID0.</a:t>
                       </a:r>
+                      <a:r>
+                        <a:rPr lang="ru-RU" baseline="0" dirty="0"/>
+                        <a:t/>
+                      </a:r>
                       <a:br>
                         <a:rPr lang="ru-RU" baseline="0" dirty="0"/>
                       </a:br>
@@ -20310,6 +21255,10 @@
                       <a:r>
                         <a:rPr lang="en-US" baseline="0" dirty="0"/>
                         <a:t>RAID0.</a:t>
+                      </a:r>
+                      <a:r>
+                        <a:rPr lang="ru-RU" baseline="0" dirty="0"/>
+                        <a:t/>
                       </a:r>
                       <a:br>
                         <a:rPr lang="ru-RU" baseline="0" dirty="0"/>
@@ -23290,7 +24239,11 @@
             <a:graphicFrameLocks noGrp="1"/>
           </p:cNvGraphicFramePr>
           <p:nvPr>
-            <p:extLst/>
+            <p:extLst>
+              <p:ext uri="{D42A27DB-BD31-4B8C-83A1-F6EECF244321}">
+                <p14:modId xmlns:p14="http://schemas.microsoft.com/office/powerpoint/2010/main" val="2109080647"/>
+              </p:ext>
+            </p:extLst>
           </p:nvPr>
         </p:nvGraphicFramePr>
         <p:xfrm>
@@ -23440,13 +24393,14 @@
                         <a:t>3000 </a:t>
                       </a:r>
                       <a:r>
-                        <a:rPr lang="ru-RU" baseline="0" dirty="0"/>
-                        <a:t>машин с </a:t>
-                      </a:r>
-                      <a:r>
-                        <a:rPr lang="en-US" baseline="0" dirty="0"/>
-                        <a:t>HW RAID.</a:t>
-                      </a:r>
+                        <a:rPr lang="ru-RU" baseline="0" dirty="0" smtClean="0"/>
+                        <a:t>машин</a:t>
+                      </a:r>
+                      <a:r>
+                        <a:rPr lang="en-US" baseline="0" dirty="0" smtClean="0"/>
+                        <a:t>.</a:t>
+                      </a:r>
+                      <a:endParaRPr lang="en-US" baseline="0" dirty="0"/>
                     </a:p>
                     <a:p>
                       <a:pPr marL="285750" lvl="0" indent="-285750">
@@ -23638,12 +24592,16 @@
             <a:graphicFrameLocks noGrp="1"/>
           </p:cNvGraphicFramePr>
           <p:nvPr>
-            <p:extLst/>
+            <p:extLst>
+              <p:ext uri="{D42A27DB-BD31-4B8C-83A1-F6EECF244321}">
+                <p14:modId xmlns:p14="http://schemas.microsoft.com/office/powerpoint/2010/main" val="518824084"/>
+              </p:ext>
+            </p:extLst>
           </p:nvPr>
         </p:nvGraphicFramePr>
         <p:xfrm>
           <a:off x="0" y="365761"/>
-          <a:ext cx="12192000" cy="2743200"/>
+          <a:ext cx="12192000" cy="3114040"/>
         </p:xfrm>
         <a:graphic>
           <a:graphicData uri="http://schemas.openxmlformats.org/drawingml/2006/table">
@@ -23955,6 +24913,37 @@
                 <a:extLst>
                   <a:ext uri="{0D108BD9-81ED-4DB2-BD59-A6C34878D82A}">
                     <a16:rowId xmlns:a16="http://schemas.microsoft.com/office/drawing/2014/main" val="10001"/>
+                  </a:ext>
+                </a:extLst>
+              </a:tr>
+              <a:tr h="370840">
+                <a:tc>
+                  <a:txBody>
+                    <a:bodyPr/>
+                    <a:lstStyle/>
+                    <a:p>
+                      <a:pPr marL="0" lvl="0" indent="0">
+                        <a:buFont typeface="Arial" charset="0"/>
+                        <a:buNone/>
+                      </a:pPr>
+                      <a:r>
+                        <a:rPr lang="en-US" dirty="0" smtClean="0">
+                          <a:hlinkClick r:id="rId3"/>
+                        </a:rPr>
+                        <a:t>https://indico.cern.ch/event/518392/contributions/2195790/attachments/1297126/1934605/EdinburghZFS.pdf</a:t>
+                      </a:r>
+                      <a:r>
+                        <a:rPr lang="en-US" dirty="0" smtClean="0"/>
+                        <a:t> </a:t>
+                      </a:r>
+                      <a:endParaRPr lang="en-US" dirty="0"/>
+                    </a:p>
+                  </a:txBody>
+                  <a:tcPr/>
+                </a:tc>
+                <a:extLst>
+                  <a:ext uri="{0D108BD9-81ED-4DB2-BD59-A6C34878D82A}">
+                    <a16:rowId xmlns:a16="http://schemas.microsoft.com/office/drawing/2014/main" val="4285386131"/>
                   </a:ext>
                 </a:extLst>
               </a:tr>
@@ -24857,13 +25846,7 @@
                         <a:rPr lang="en-US" dirty="0">
                           <a:hlinkClick r:id="rId4"/>
                         </a:rPr>
-                        <a:t>https://www.usenix.org/system/files/conference/fast18/fast18-alagappan.pd</a:t>
-                      </a:r>
-                      <a:r>
-                        <a:rPr lang="en-US" dirty="0">
-                          <a:hlinkClick r:id="rId4"/>
-                        </a:rPr>
-                        <a:t>f</a:t>
+                        <a:t>https://www.usenix.org/system/files/conference/fast18/fast18-alagappan.pdf</a:t>
                       </a:r>
                       <a:endParaRPr lang="en-US" dirty="0"/>
                     </a:p>
@@ -25301,7 +26284,7 @@
                           <a:hlinkClick r:id="rId3">
                             <a:extLst>
                               <a:ext uri="{A12FA001-AC4F-418D-AE19-62706E023703}">
-                                <ahyp:hlinkClr xmlns:ahyp="http://schemas.microsoft.com/office/drawing/2018/hyperlinkcolor" val="tx"/>
+                                <ahyp:hlinkClr xmlns:ahyp="http://schemas.microsoft.com/office/drawing/2018/hyperlinkcolor" xmlns="" val="tx"/>
                               </a:ext>
                             </a:extLst>
                           </a:hlinkClick>
@@ -25341,7 +26324,7 @@
                           <a:hlinkClick r:id="rId4">
                             <a:extLst>
                               <a:ext uri="{A12FA001-AC4F-418D-AE19-62706E023703}">
-                                <ahyp:hlinkClr xmlns:ahyp="http://schemas.microsoft.com/office/drawing/2018/hyperlinkcolor" val="tx"/>
+                                <ahyp:hlinkClr xmlns:ahyp="http://schemas.microsoft.com/office/drawing/2018/hyperlinkcolor" xmlns="" val="tx"/>
                               </a:ext>
                             </a:extLst>
                           </a:hlinkClick>
@@ -25358,7 +26341,7 @@
                           <a:hlinkClick r:id="rId4">
                             <a:extLst>
                               <a:ext uri="{A12FA001-AC4F-418D-AE19-62706E023703}">
-                                <ahyp:hlinkClr xmlns:ahyp="http://schemas.microsoft.com/office/drawing/2018/hyperlinkcolor" val="tx"/>
+                                <ahyp:hlinkClr xmlns:ahyp="http://schemas.microsoft.com/office/drawing/2018/hyperlinkcolor" xmlns="" val="tx"/>
                               </a:ext>
                             </a:extLst>
                           </a:hlinkClick>
@@ -25830,7 +26813,7 @@
                           <a:hlinkClick r:id="rId3">
                             <a:extLst>
                               <a:ext uri="{A12FA001-AC4F-418D-AE19-62706E023703}">
-                                <ahyp:hlinkClr xmlns:ahyp="http://schemas.microsoft.com/office/drawing/2018/hyperlinkcolor" val="tx"/>
+                                <ahyp:hlinkClr xmlns:ahyp="http://schemas.microsoft.com/office/drawing/2018/hyperlinkcolor" xmlns="" val="tx"/>
                               </a:ext>
                             </a:extLst>
                           </a:hlinkClick>
@@ -25870,7 +26853,7 @@
                           <a:hlinkClick r:id="rId4">
                             <a:extLst>
                               <a:ext uri="{A12FA001-AC4F-418D-AE19-62706E023703}">
-                                <ahyp:hlinkClr xmlns:ahyp="http://schemas.microsoft.com/office/drawing/2018/hyperlinkcolor" val="tx"/>
+                                <ahyp:hlinkClr xmlns:ahyp="http://schemas.microsoft.com/office/drawing/2018/hyperlinkcolor" xmlns="" val="tx"/>
                               </a:ext>
                             </a:extLst>
                           </a:hlinkClick>
@@ -25887,7 +26870,7 @@
                           <a:hlinkClick r:id="rId4">
                             <a:extLst>
                               <a:ext uri="{A12FA001-AC4F-418D-AE19-62706E023703}">
-                                <ahyp:hlinkClr xmlns:ahyp="http://schemas.microsoft.com/office/drawing/2018/hyperlinkcolor" val="tx"/>
+                                <ahyp:hlinkClr xmlns:ahyp="http://schemas.microsoft.com/office/drawing/2018/hyperlinkcolor" xmlns="" val="tx"/>
                               </a:ext>
                             </a:extLst>
                           </a:hlinkClick>
@@ -26328,7 +27311,7 @@
                           <a:hlinkClick r:id="rId3">
                             <a:extLst>
                               <a:ext uri="{A12FA001-AC4F-418D-AE19-62706E023703}">
-                                <ahyp:hlinkClr xmlns:ahyp="http://schemas.microsoft.com/office/drawing/2018/hyperlinkcolor" val="tx"/>
+                                <ahyp:hlinkClr xmlns:ahyp="http://schemas.microsoft.com/office/drawing/2018/hyperlinkcolor" xmlns="" val="tx"/>
                               </a:ext>
                             </a:extLst>
                           </a:hlinkClick>
@@ -26368,7 +27351,7 @@
                           <a:hlinkClick r:id="rId4">
                             <a:extLst>
                               <a:ext uri="{A12FA001-AC4F-418D-AE19-62706E023703}">
-                                <ahyp:hlinkClr xmlns:ahyp="http://schemas.microsoft.com/office/drawing/2018/hyperlinkcolor" val="tx"/>
+                                <ahyp:hlinkClr xmlns:ahyp="http://schemas.microsoft.com/office/drawing/2018/hyperlinkcolor" xmlns="" val="tx"/>
                               </a:ext>
                             </a:extLst>
                           </a:hlinkClick>
@@ -26385,7 +27368,7 @@
                           <a:hlinkClick r:id="rId4">
                             <a:extLst>
                               <a:ext uri="{A12FA001-AC4F-418D-AE19-62706E023703}">
-                                <ahyp:hlinkClr xmlns:ahyp="http://schemas.microsoft.com/office/drawing/2018/hyperlinkcolor" val="tx"/>
+                                <ahyp:hlinkClr xmlns:ahyp="http://schemas.microsoft.com/office/drawing/2018/hyperlinkcolor" xmlns="" val="tx"/>
                               </a:ext>
                             </a:extLst>
                           </a:hlinkClick>

</xml_diff>